<commit_message>
Making 2nd report completed
</commit_message>
<xml_diff>
--- a/주간보고서/2주차/소프트웨어프로젝트_주간보고서_2주차_18017103황제현.pptx
+++ b/주간보고서/2주차/소프트웨어프로젝트_주간보고서_2주차_18017103황제현.pptx
@@ -3687,16 +3687,12 @@
               <a:t>평문</a:t>
             </a:r>
             <a:r>
+              <a:rPr lang="ko-KR" altLang="en-US" sz="2000" dirty="0"/>
+              <a:t> 암호화 단계의 </a:t>
+            </a:r>
+            <a:r>
               <a:rPr lang="ko-KR" altLang="en-US" sz="2000"/>
-              <a:t> 암호화 </a:t>
-            </a:r>
-            <a:r>
-              <a:rPr lang="ko-KR" altLang="en-US" sz="2000" dirty="0"/>
-              <a:t>단계의 초기 버전을 작성하였다</a:t>
-            </a:r>
-            <a:r>
-              <a:rPr lang="en-US" altLang="ko-KR" sz="2000" dirty="0"/>
-              <a:t>.</a:t>
+              <a:t>초기 버전 작성</a:t>
             </a:r>
             <a:endParaRPr lang="ko-KR" altLang="en-US" sz="2000" dirty="0"/>
           </a:p>

</xml_diff>